<commit_message>
transformer information upload (unfinished)
</commit_message>
<xml_diff>
--- a/論文導讀/2_Transformer/Attention is all you need.pptx
+++ b/論文導讀/2_Transformer/Attention is all you need.pptx
@@ -271,7 +271,7 @@
           <a:p>
             <a:fld id="{FA99FD5E-D554-4401-B340-088042D58529}" type="datetimeFigureOut">
               <a:rPr lang="zh-TW" altLang="en-US" smtClean="0"/>
-              <a:t>2022/9/27</a:t>
+              <a:t>2022/10/12</a:t>
             </a:fld>
             <a:endParaRPr lang="zh-TW" altLang="en-US"/>
           </a:p>
@@ -441,7 +441,7 @@
           <a:p>
             <a:fld id="{FA99FD5E-D554-4401-B340-088042D58529}" type="datetimeFigureOut">
               <a:rPr lang="zh-TW" altLang="en-US" smtClean="0"/>
-              <a:t>2022/9/27</a:t>
+              <a:t>2022/10/12</a:t>
             </a:fld>
             <a:endParaRPr lang="zh-TW" altLang="en-US"/>
           </a:p>
@@ -621,7 +621,7 @@
           <a:p>
             <a:fld id="{FA99FD5E-D554-4401-B340-088042D58529}" type="datetimeFigureOut">
               <a:rPr lang="zh-TW" altLang="en-US" smtClean="0"/>
-              <a:t>2022/9/27</a:t>
+              <a:t>2022/10/12</a:t>
             </a:fld>
             <a:endParaRPr lang="zh-TW" altLang="en-US"/>
           </a:p>
@@ -791,7 +791,7 @@
           <a:p>
             <a:fld id="{FA99FD5E-D554-4401-B340-088042D58529}" type="datetimeFigureOut">
               <a:rPr lang="zh-TW" altLang="en-US" smtClean="0"/>
-              <a:t>2022/9/27</a:t>
+              <a:t>2022/10/12</a:t>
             </a:fld>
             <a:endParaRPr lang="zh-TW" altLang="en-US"/>
           </a:p>
@@ -1037,7 +1037,7 @@
           <a:p>
             <a:fld id="{FA99FD5E-D554-4401-B340-088042D58529}" type="datetimeFigureOut">
               <a:rPr lang="zh-TW" altLang="en-US" smtClean="0"/>
-              <a:t>2022/9/27</a:t>
+              <a:t>2022/10/12</a:t>
             </a:fld>
             <a:endParaRPr lang="zh-TW" altLang="en-US"/>
           </a:p>
@@ -1269,7 +1269,7 @@
           <a:p>
             <a:fld id="{FA99FD5E-D554-4401-B340-088042D58529}" type="datetimeFigureOut">
               <a:rPr lang="zh-TW" altLang="en-US" smtClean="0"/>
-              <a:t>2022/9/27</a:t>
+              <a:t>2022/10/12</a:t>
             </a:fld>
             <a:endParaRPr lang="zh-TW" altLang="en-US"/>
           </a:p>
@@ -1636,7 +1636,7 @@
           <a:p>
             <a:fld id="{FA99FD5E-D554-4401-B340-088042D58529}" type="datetimeFigureOut">
               <a:rPr lang="zh-TW" altLang="en-US" smtClean="0"/>
-              <a:t>2022/9/27</a:t>
+              <a:t>2022/10/12</a:t>
             </a:fld>
             <a:endParaRPr lang="zh-TW" altLang="en-US"/>
           </a:p>
@@ -1754,7 +1754,7 @@
           <a:p>
             <a:fld id="{FA99FD5E-D554-4401-B340-088042D58529}" type="datetimeFigureOut">
               <a:rPr lang="zh-TW" altLang="en-US" smtClean="0"/>
-              <a:t>2022/9/27</a:t>
+              <a:t>2022/10/12</a:t>
             </a:fld>
             <a:endParaRPr lang="zh-TW" altLang="en-US"/>
           </a:p>
@@ -1849,7 +1849,7 @@
           <a:p>
             <a:fld id="{FA99FD5E-D554-4401-B340-088042D58529}" type="datetimeFigureOut">
               <a:rPr lang="zh-TW" altLang="en-US" smtClean="0"/>
-              <a:t>2022/9/27</a:t>
+              <a:t>2022/10/12</a:t>
             </a:fld>
             <a:endParaRPr lang="zh-TW" altLang="en-US"/>
           </a:p>
@@ -2126,7 +2126,7 @@
           <a:p>
             <a:fld id="{FA99FD5E-D554-4401-B340-088042D58529}" type="datetimeFigureOut">
               <a:rPr lang="zh-TW" altLang="en-US" smtClean="0"/>
-              <a:t>2022/9/27</a:t>
+              <a:t>2022/10/12</a:t>
             </a:fld>
             <a:endParaRPr lang="zh-TW" altLang="en-US"/>
           </a:p>
@@ -2379,7 +2379,7 @@
           <a:p>
             <a:fld id="{FA99FD5E-D554-4401-B340-088042D58529}" type="datetimeFigureOut">
               <a:rPr lang="zh-TW" altLang="en-US" smtClean="0"/>
-              <a:t>2022/9/27</a:t>
+              <a:t>2022/10/12</a:t>
             </a:fld>
             <a:endParaRPr lang="zh-TW" altLang="en-US"/>
           </a:p>
@@ -2592,7 +2592,7 @@
           <a:p>
             <a:fld id="{FA99FD5E-D554-4401-B340-088042D58529}" type="datetimeFigureOut">
               <a:rPr lang="zh-TW" altLang="en-US" smtClean="0"/>
-              <a:t>2022/9/27</a:t>
+              <a:t>2022/10/12</a:t>
             </a:fld>
             <a:endParaRPr lang="zh-TW" altLang="en-US"/>
           </a:p>

</xml_diff>